<commit_message>
Fehlerfälle eingefügt, Fifo Problem gelöscht
</commit_message>
<xml_diff>
--- a/Präsentationen/Endpräsi.pptx
+++ b/Präsentationen/Endpräsi.pptx
@@ -5,10 +5,10 @@
     <p:sldMasterId id="2147483656" r:id="rId1"/>
   </p:sldMasterIdLst>
   <p:notesMasterIdLst>
-    <p:notesMasterId r:id="rId14"/>
+    <p:notesMasterId r:id="rId15"/>
   </p:notesMasterIdLst>
   <p:handoutMasterIdLst>
-    <p:handoutMasterId r:id="rId15"/>
+    <p:handoutMasterId r:id="rId16"/>
   </p:handoutMasterIdLst>
   <p:sldIdLst>
     <p:sldId id="334" r:id="rId2"/>
@@ -20,14 +20,15 @@
     <p:sldId id="436" r:id="rId8"/>
     <p:sldId id="445" r:id="rId9"/>
     <p:sldId id="446" r:id="rId10"/>
-    <p:sldId id="437" r:id="rId11"/>
-    <p:sldId id="441" r:id="rId12"/>
-    <p:sldId id="440" r:id="rId13"/>
+    <p:sldId id="448" r:id="rId11"/>
+    <p:sldId id="437" r:id="rId12"/>
+    <p:sldId id="441" r:id="rId13"/>
+    <p:sldId id="440" r:id="rId14"/>
   </p:sldIdLst>
   <p:sldSz cx="9906000" cy="6858000" type="A4"/>
   <p:notesSz cx="6854825" cy="9750425"/>
   <p:custDataLst>
-    <p:tags r:id="rId16"/>
+    <p:tags r:id="rId17"/>
   </p:custDataLst>
   <p:defaultTextStyle>
     <a:defPPr>
@@ -3054,7 +3055,7 @@
           <p:cNvPr id="2" name="Titel 1">
             <a:extLst>
               <a:ext uri="{FF2B5EF4-FFF2-40B4-BE49-F238E27FC236}">
-                <a16:creationId xmlns:a16="http://schemas.microsoft.com/office/drawing/2014/main" id="{69D175C7-2277-48EE-80FF-0E761953819F}"/>
+                <a16:creationId xmlns:a16="http://schemas.microsoft.com/office/drawing/2014/main" id="{77C7410A-A749-403D-90C6-63AE79254069}"/>
               </a:ext>
             </a:extLst>
           </p:cNvPr>
@@ -3071,8 +3072,8 @@
           <a:lstStyle/>
           <a:p>
             <a:r>
-              <a:rPr lang="de-DE" sz="1800" dirty="0"/>
-              <a:t>3. Probleme und Lösungen  </a:t>
+              <a:rPr lang="de-DE" dirty="0"/>
+              <a:t>Fehler-Handling</a:t>
             </a:r>
           </a:p>
         </p:txBody>
@@ -3082,7 +3083,7 @@
           <p:cNvPr id="3" name="Inhaltsplatzhalter 2">
             <a:extLst>
               <a:ext uri="{FF2B5EF4-FFF2-40B4-BE49-F238E27FC236}">
-                <a16:creationId xmlns:a16="http://schemas.microsoft.com/office/drawing/2014/main" id="{D48E999B-3E55-4E29-B367-1F5A664CD438}"/>
+                <a16:creationId xmlns:a16="http://schemas.microsoft.com/office/drawing/2014/main" id="{6ABAA3C3-7524-4E18-9B49-AA59EE12C569}"/>
               </a:ext>
             </a:extLst>
           </p:cNvPr>
@@ -3097,189 +3098,56 @@
         <p:txBody>
           <a:bodyPr/>
           <a:lstStyle/>
-          <a:p>
-            <a:pPr marL="285750" indent="-285750">
-              <a:buFont typeface="Arial" panose="020B0604020202020204" pitchFamily="34" charset="0"/>
-              <a:buChar char="•"/>
-            </a:pPr>
-            <a:r>
-              <a:rPr lang="de-DE" sz="1800" b="1" dirty="0"/>
-              <a:t>P:</a:t>
-            </a:r>
-            <a:r>
-              <a:rPr lang="de-DE" sz="1800" dirty="0"/>
-              <a:t> IR-Erkennung zwischen zwei Sensoren</a:t>
-            </a:r>
-          </a:p>
-          <a:p>
-            <a:pPr lvl="3">
-              <a:buFont typeface="Arial" panose="020B0604020202020204" pitchFamily="34" charset="0"/>
-              <a:buChar char="•"/>
-            </a:pPr>
-            <a:r>
-              <a:rPr lang="de-DE" sz="1800" b="1" dirty="0"/>
-              <a:t>L:</a:t>
-            </a:r>
-            <a:r>
-              <a:rPr lang="de-DE" sz="1800" dirty="0"/>
-              <a:t> </a:t>
-            </a:r>
-            <a:r>
-              <a:rPr lang="de-DE" sz="1800" dirty="0" err="1"/>
-              <a:t>Robotino</a:t>
-            </a:r>
-            <a:r>
-              <a:rPr lang="de-DE" sz="1800" dirty="0"/>
-              <a:t> während der Fahrt drehen lassen</a:t>
-            </a:r>
-          </a:p>
           <a:p>
             <a:pPr>
               <a:buFont typeface="Arial" panose="020B0604020202020204" pitchFamily="34" charset="0"/>
               <a:buChar char="•"/>
             </a:pPr>
             <a:r>
-              <a:rPr lang="de-DE" sz="1800" b="1" dirty="0"/>
-              <a:t>P:</a:t>
-            </a:r>
-            <a:r>
               <a:rPr lang="de-DE" sz="1800" dirty="0"/>
-              <a:t> Kollisionen</a:t>
-            </a:r>
-          </a:p>
-          <a:p>
-            <a:pPr lvl="3">
-              <a:buFont typeface="Arial" panose="020B0604020202020204" pitchFamily="34" charset="0"/>
-              <a:buChar char="•"/>
-            </a:pPr>
-            <a:r>
-              <a:rPr lang="de-DE" sz="1800" b="1" dirty="0"/>
-              <a:t>L: </a:t>
-            </a:r>
-            <a:r>
-              <a:rPr lang="de-DE" sz="1800" dirty="0"/>
-              <a:t>Potentialfelder erhöhen, Geschwindigkeit anpassen</a:t>
-            </a:r>
-          </a:p>
-          <a:p>
-            <a:pPr>
-              <a:buFont typeface="Arial" panose="020B0604020202020204" pitchFamily="34" charset="0"/>
-              <a:buChar char="•"/>
-            </a:pPr>
-            <a:r>
-              <a:rPr lang="de-DE" sz="1800" b="1" dirty="0"/>
-              <a:t>P: </a:t>
-            </a:r>
-            <a:r>
-              <a:rPr lang="de-DE" sz="1800" dirty="0"/>
-              <a:t>Ausweichmanöver</a:t>
-            </a:r>
-          </a:p>
-          <a:p>
-            <a:pPr lvl="3">
-              <a:buFont typeface="Arial" panose="020B0604020202020204" pitchFamily="34" charset="0"/>
-              <a:buChar char="•"/>
-            </a:pPr>
-            <a:r>
-              <a:rPr lang="de-DE" sz="1800" b="1" dirty="0"/>
-              <a:t>L:</a:t>
-            </a:r>
-            <a:r>
-              <a:rPr lang="de-DE" sz="1800" dirty="0"/>
-              <a:t> Raum in unterschiedliche Bereiche einteilen</a:t>
-            </a:r>
-          </a:p>
-          <a:p>
-            <a:pPr>
-              <a:buFont typeface="Arial" panose="020B0604020202020204" pitchFamily="34" charset="0"/>
-              <a:buChar char="•"/>
-            </a:pPr>
-            <a:r>
-              <a:rPr lang="de-DE" sz="1800" b="1" dirty="0"/>
-              <a:t>P:</a:t>
-            </a:r>
-            <a:r>
-              <a:rPr lang="de-DE" sz="1800" dirty="0"/>
-              <a:t> FIFO</a:t>
-            </a:r>
-          </a:p>
-          <a:p>
-            <a:pPr lvl="3">
-              <a:buFont typeface="Arial" panose="020B0604020202020204" pitchFamily="34" charset="0"/>
-              <a:buChar char="•"/>
-            </a:pPr>
-            <a:r>
-              <a:rPr lang="de-DE" sz="1800" b="1" dirty="0"/>
-              <a:t>L: </a:t>
-            </a:r>
-            <a:r>
-              <a:rPr lang="de-DE" sz="1800" dirty="0"/>
-              <a:t>Noch keine Lösung gefunden</a:t>
-            </a:r>
-          </a:p>
-          <a:p>
-            <a:pPr lvl="1">
-              <a:buFont typeface="Arial" panose="020B0604020202020204" pitchFamily="34" charset="0"/>
-              <a:buChar char="•"/>
-            </a:pPr>
-            <a:endParaRPr lang="de-DE" sz="1800" dirty="0"/>
-          </a:p>
-          <a:p>
-            <a:pPr lvl="1">
-              <a:buFont typeface="Arial" panose="020B0604020202020204" pitchFamily="34" charset="0"/>
-              <a:buChar char="•"/>
-            </a:pPr>
-            <a:endParaRPr lang="de-DE" sz="1800" dirty="0"/>
+              <a:t>Fehlerfälle: </a:t>
+            </a:r>
           </a:p>
           <a:p>
             <a:pPr lvl="2">
               <a:buFont typeface="Arial" panose="020B0604020202020204" pitchFamily="34" charset="0"/>
               <a:buChar char="•"/>
             </a:pPr>
-            <a:endParaRPr lang="de-DE" sz="1800" dirty="0"/>
+            <a:r>
+              <a:rPr lang="de-DE" sz="1800" dirty="0"/>
+              <a:t>Kein Werkstück vorhanden, wo eins abgeholt werden soll</a:t>
+            </a:r>
           </a:p>
           <a:p>
             <a:pPr lvl="2">
               <a:buFont typeface="Arial" panose="020B0604020202020204" pitchFamily="34" charset="0"/>
               <a:buChar char="•"/>
             </a:pPr>
-            <a:endParaRPr lang="de-DE" sz="1800" dirty="0"/>
-          </a:p>
-          <a:p>
-            <a:pPr marL="0" indent="0"/>
-            <a:endParaRPr lang="de-DE" sz="1800" dirty="0"/>
-          </a:p>
-          <a:p>
-            <a:pPr marL="0" indent="0"/>
-            <a:endParaRPr lang="de-DE" sz="1800" dirty="0"/>
-          </a:p>
-          <a:p>
-            <a:pPr>
+            <a:r>
+              <a:rPr lang="de-DE" sz="1800" dirty="0"/>
+              <a:t>Bereits ein Werkstück da, wo eins abgelegt werden soll</a:t>
+            </a:r>
+          </a:p>
+          <a:p>
+            <a:pPr lvl="2">
               <a:buFont typeface="Arial" panose="020B0604020202020204" pitchFamily="34" charset="0"/>
               <a:buChar char="•"/>
             </a:pPr>
-            <a:endParaRPr lang="de-DE" sz="1800" dirty="0"/>
-          </a:p>
-          <a:p>
-            <a:pPr>
+            <a:r>
+              <a:rPr lang="de-DE" sz="1800" dirty="0"/>
+              <a:t>Station und alle </a:t>
+            </a:r>
+            <a:r>
+              <a:rPr lang="de-DE" sz="1800"/>
+              <a:t>Fifo-Plätze besetzt</a:t>
+            </a:r>
+          </a:p>
+          <a:p>
+            <a:pPr lvl="2">
               <a:buFont typeface="Arial" panose="020B0604020202020204" pitchFamily="34" charset="0"/>
               <a:buChar char="•"/>
             </a:pPr>
-            <a:endParaRPr lang="de-DE" sz="1800" dirty="0"/>
-          </a:p>
-          <a:p>
-            <a:pPr>
-              <a:buFont typeface="Arial" panose="020B0604020202020204" pitchFamily="34" charset="0"/>
-              <a:buChar char="•"/>
-            </a:pPr>
-            <a:endParaRPr lang="de-DE" sz="1800" dirty="0"/>
-          </a:p>
-          <a:p>
-            <a:pPr>
-              <a:buFont typeface="Arial" panose="020B0604020202020204" pitchFamily="34" charset="0"/>
-              <a:buChar char="•"/>
-            </a:pPr>
-            <a:endParaRPr lang="de-DE" dirty="0"/>
+            <a:endParaRPr lang="de-DE" sz="1800"/>
           </a:p>
         </p:txBody>
       </p:sp>
@@ -3288,7 +3156,7 @@
           <p:cNvPr id="4" name="Fußzeilenplatzhalter 3">
             <a:extLst>
               <a:ext uri="{FF2B5EF4-FFF2-40B4-BE49-F238E27FC236}">
-                <a16:creationId xmlns:a16="http://schemas.microsoft.com/office/drawing/2014/main" id="{2137E165-7B19-4681-A71E-0B75A5F168F0}"/>
+                <a16:creationId xmlns:a16="http://schemas.microsoft.com/office/drawing/2014/main" id="{78B07854-0228-4BD8-B365-CD96563C4722}"/>
               </a:ext>
             </a:extLst>
           </p:cNvPr>
@@ -3308,28 +3176,14 @@
               <a:defRPr/>
             </a:pPr>
             <a:r>
-              <a:rPr lang="de-DE" dirty="0"/>
-              <a:t>VPJ Gewerk 2 |  Bahnplanung  | </a:t>
-            </a:r>
-            <a:r>
-              <a:rPr lang="de-DE" dirty="0" err="1"/>
-              <a:t>SoSe</a:t>
-            </a:r>
-            <a:r>
-              <a:rPr lang="de-DE" dirty="0"/>
-              <a:t> 2018  </a:t>
-            </a:r>
-            <a:r>
-              <a:rPr lang="de-DE" dirty="0">
+              <a:rPr lang="de-DE"/>
+              <a:t>VPJ Gewerk 2 |  Bahnplanung  |  SoSe 2018  </a:t>
+            </a:r>
+            <a:r>
+              <a:rPr lang="de-DE">
                 <a:cs typeface="Arial" charset="0"/>
               </a:rPr>
-              <a:t>|  Robin Möller, Inke Heynen, Jan </a:t>
-            </a:r>
-            <a:r>
-              <a:rPr lang="de-DE" dirty="0" err="1">
-                <a:cs typeface="Arial" charset="0"/>
-              </a:rPr>
-              <a:t>Gellermann</a:t>
+              <a:t>|  Robin Möller, Inke Heynen, Jan Gellermann</a:t>
             </a:r>
             <a:endParaRPr lang="de-DE" dirty="0">
               <a:cs typeface="Arial" charset="0"/>
@@ -3342,7 +3196,7 @@
           <p:cNvPr id="5" name="Foliennummernplatzhalter 4">
             <a:extLst>
               <a:ext uri="{FF2B5EF4-FFF2-40B4-BE49-F238E27FC236}">
-                <a16:creationId xmlns:a16="http://schemas.microsoft.com/office/drawing/2014/main" id="{4C25DBB2-B24D-49AD-BB7F-6A16BA69840D}"/>
+                <a16:creationId xmlns:a16="http://schemas.microsoft.com/office/drawing/2014/main" id="{BCD3049B-3E92-4BC4-B654-90432C8C6D39}"/>
               </a:ext>
             </a:extLst>
           </p:cNvPr>
@@ -3377,7 +3231,7 @@
     </p:spTree>
     <p:extLst>
       <p:ext uri="{BB962C8B-B14F-4D97-AF65-F5344CB8AC3E}">
-        <p14:creationId xmlns:p14="http://schemas.microsoft.com/office/powerpoint/2010/main" val="3861007313"/>
+        <p14:creationId xmlns:p14="http://schemas.microsoft.com/office/powerpoint/2010/main" val="2800754241"/>
       </p:ext>
     </p:extLst>
   </p:cSld>
@@ -3410,7 +3264,7 @@
           <p:cNvPr id="2" name="Titel 1">
             <a:extLst>
               <a:ext uri="{FF2B5EF4-FFF2-40B4-BE49-F238E27FC236}">
-                <a16:creationId xmlns:a16="http://schemas.microsoft.com/office/drawing/2014/main" id="{F3639E51-5011-4217-810D-F122D87922E7}"/>
+                <a16:creationId xmlns:a16="http://schemas.microsoft.com/office/drawing/2014/main" id="{69D175C7-2277-48EE-80FF-0E761953819F}"/>
               </a:ext>
             </a:extLst>
           </p:cNvPr>
@@ -3427,12 +3281,8 @@
           <a:lstStyle/>
           <a:p>
             <a:r>
-              <a:rPr lang="de-DE" dirty="0" err="1"/>
-              <a:t>Robotino</a:t>
-            </a:r>
-            <a:r>
-              <a:rPr lang="de-DE" dirty="0"/>
-              <a:t> 2.0</a:t>
+              <a:rPr lang="de-DE" sz="1800" dirty="0"/>
+              <a:t>3. Probleme und Lösungen  </a:t>
             </a:r>
           </a:p>
         </p:txBody>
@@ -3442,7 +3292,7 @@
           <p:cNvPr id="3" name="Inhaltsplatzhalter 2">
             <a:extLst>
               <a:ext uri="{FF2B5EF4-FFF2-40B4-BE49-F238E27FC236}">
-                <a16:creationId xmlns:a16="http://schemas.microsoft.com/office/drawing/2014/main" id="{A1594824-0012-4797-AAE7-048655F517C9}"/>
+                <a16:creationId xmlns:a16="http://schemas.microsoft.com/office/drawing/2014/main" id="{D48E999B-3E55-4E29-B367-1F5A664CD438}"/>
               </a:ext>
             </a:extLst>
           </p:cNvPr>
@@ -3463,37 +3313,155 @@
               <a:buChar char="•"/>
             </a:pPr>
             <a:r>
+              <a:rPr lang="de-DE" sz="1800" b="1" dirty="0"/>
+              <a:t>P:</a:t>
+            </a:r>
+            <a:r>
               <a:rPr lang="de-DE" sz="1800" dirty="0"/>
-              <a:t>Im Prinzip gleiches Programm wie </a:t>
-            </a:r>
-            <a:r>
-              <a:rPr lang="de-DE" sz="1800" dirty="0" err="1"/>
-              <a:t>Robotino</a:t>
-            </a:r>
-            <a:r>
-              <a:rPr lang="de-DE" sz="1800" dirty="0"/>
-              <a:t> 1.0</a:t>
-            </a:r>
-          </a:p>
-          <a:p>
-            <a:pPr marL="285750" indent="-285750">
+              <a:t> IR-Erkennung zwischen zwei Sensoren</a:t>
+            </a:r>
+          </a:p>
+          <a:p>
+            <a:pPr lvl="3">
               <a:buFont typeface="Arial" panose="020B0604020202020204" pitchFamily="34" charset="0"/>
               <a:buChar char="•"/>
             </a:pPr>
             <a:r>
+              <a:rPr lang="de-DE" sz="1800" b="1" dirty="0"/>
+              <a:t>L:</a:t>
+            </a:r>
+            <a:r>
               <a:rPr lang="de-DE" sz="1800" dirty="0"/>
-              <a:t>Wenig Anpassungen</a:t>
-            </a:r>
-          </a:p>
-          <a:p>
-            <a:pPr marL="285750" indent="-285750">
+              <a:t> </a:t>
+            </a:r>
+            <a:r>
+              <a:rPr lang="de-DE" sz="1800" dirty="0" err="1"/>
+              <a:t>Robotino</a:t>
+            </a:r>
+            <a:r>
+              <a:rPr lang="de-DE" sz="1800" dirty="0"/>
+              <a:t> während der Fahrt drehen lassen</a:t>
+            </a:r>
+          </a:p>
+          <a:p>
+            <a:pPr>
               <a:buFont typeface="Arial" panose="020B0604020202020204" pitchFamily="34" charset="0"/>
               <a:buChar char="•"/>
             </a:pPr>
             <a:r>
+              <a:rPr lang="de-DE" sz="1800" b="1" dirty="0"/>
+              <a:t>P:</a:t>
+            </a:r>
+            <a:r>
               <a:rPr lang="de-DE" sz="1800" dirty="0"/>
-              <a:t>Eigene Ladestation und Übergabepunkte</a:t>
-            </a:r>
+              <a:t> Kollisionen</a:t>
+            </a:r>
+          </a:p>
+          <a:p>
+            <a:pPr lvl="3">
+              <a:buFont typeface="Arial" panose="020B0604020202020204" pitchFamily="34" charset="0"/>
+              <a:buChar char="•"/>
+            </a:pPr>
+            <a:r>
+              <a:rPr lang="de-DE" sz="1800" b="1" dirty="0"/>
+              <a:t>L: </a:t>
+            </a:r>
+            <a:r>
+              <a:rPr lang="de-DE" sz="1800" dirty="0"/>
+              <a:t>Potentialfelder erhöhen, Geschwindigkeit anpassen</a:t>
+            </a:r>
+          </a:p>
+          <a:p>
+            <a:pPr>
+              <a:buFont typeface="Arial" panose="020B0604020202020204" pitchFamily="34" charset="0"/>
+              <a:buChar char="•"/>
+            </a:pPr>
+            <a:r>
+              <a:rPr lang="de-DE" sz="1800" b="1" dirty="0"/>
+              <a:t>P: </a:t>
+            </a:r>
+            <a:r>
+              <a:rPr lang="de-DE" sz="1800" dirty="0"/>
+              <a:t>Ausweichmanöver</a:t>
+            </a:r>
+          </a:p>
+          <a:p>
+            <a:pPr lvl="3">
+              <a:buFont typeface="Arial" panose="020B0604020202020204" pitchFamily="34" charset="0"/>
+              <a:buChar char="•"/>
+            </a:pPr>
+            <a:r>
+              <a:rPr lang="de-DE" sz="1800" b="1" dirty="0"/>
+              <a:t>L:</a:t>
+            </a:r>
+            <a:r>
+              <a:rPr lang="de-DE" sz="1800" dirty="0"/>
+              <a:t> Raum in unterschiedliche Bereiche einteilen</a:t>
+            </a:r>
+          </a:p>
+          <a:p>
+            <a:pPr lvl="1">
+              <a:buFont typeface="Arial" panose="020B0604020202020204" pitchFamily="34" charset="0"/>
+              <a:buChar char="•"/>
+            </a:pPr>
+            <a:endParaRPr lang="de-DE" sz="1800" dirty="0"/>
+          </a:p>
+          <a:p>
+            <a:pPr lvl="1">
+              <a:buFont typeface="Arial" panose="020B0604020202020204" pitchFamily="34" charset="0"/>
+              <a:buChar char="•"/>
+            </a:pPr>
+            <a:endParaRPr lang="de-DE" sz="1800" dirty="0"/>
+          </a:p>
+          <a:p>
+            <a:pPr lvl="2">
+              <a:buFont typeface="Arial" panose="020B0604020202020204" pitchFamily="34" charset="0"/>
+              <a:buChar char="•"/>
+            </a:pPr>
+            <a:endParaRPr lang="de-DE" sz="1800" dirty="0"/>
+          </a:p>
+          <a:p>
+            <a:pPr lvl="2">
+              <a:buFont typeface="Arial" panose="020B0604020202020204" pitchFamily="34" charset="0"/>
+              <a:buChar char="•"/>
+            </a:pPr>
+            <a:endParaRPr lang="de-DE" sz="1800" dirty="0"/>
+          </a:p>
+          <a:p>
+            <a:pPr marL="0" indent="0"/>
+            <a:endParaRPr lang="de-DE" sz="1800" dirty="0"/>
+          </a:p>
+          <a:p>
+            <a:pPr marL="0" indent="0"/>
+            <a:endParaRPr lang="de-DE" sz="1800" dirty="0"/>
+          </a:p>
+          <a:p>
+            <a:pPr>
+              <a:buFont typeface="Arial" panose="020B0604020202020204" pitchFamily="34" charset="0"/>
+              <a:buChar char="•"/>
+            </a:pPr>
+            <a:endParaRPr lang="de-DE" sz="1800" dirty="0"/>
+          </a:p>
+          <a:p>
+            <a:pPr>
+              <a:buFont typeface="Arial" panose="020B0604020202020204" pitchFamily="34" charset="0"/>
+              <a:buChar char="•"/>
+            </a:pPr>
+            <a:endParaRPr lang="de-DE" sz="1800" dirty="0"/>
+          </a:p>
+          <a:p>
+            <a:pPr>
+              <a:buFont typeface="Arial" panose="020B0604020202020204" pitchFamily="34" charset="0"/>
+              <a:buChar char="•"/>
+            </a:pPr>
+            <a:endParaRPr lang="de-DE" sz="1800" dirty="0"/>
+          </a:p>
+          <a:p>
+            <a:pPr>
+              <a:buFont typeface="Arial" panose="020B0604020202020204" pitchFamily="34" charset="0"/>
+              <a:buChar char="•"/>
+            </a:pPr>
+            <a:endParaRPr lang="de-DE" dirty="0"/>
           </a:p>
         </p:txBody>
       </p:sp>
@@ -3502,7 +3470,7 @@
           <p:cNvPr id="4" name="Fußzeilenplatzhalter 3">
             <a:extLst>
               <a:ext uri="{FF2B5EF4-FFF2-40B4-BE49-F238E27FC236}">
-                <a16:creationId xmlns:a16="http://schemas.microsoft.com/office/drawing/2014/main" id="{10069B3C-7643-4D6C-9022-3F34C2215C51}"/>
+                <a16:creationId xmlns:a16="http://schemas.microsoft.com/office/drawing/2014/main" id="{2137E165-7B19-4681-A71E-0B75A5F168F0}"/>
               </a:ext>
             </a:extLst>
           </p:cNvPr>
@@ -3522,14 +3490,28 @@
               <a:defRPr/>
             </a:pPr>
             <a:r>
-              <a:rPr lang="de-DE"/>
-              <a:t>VPJ Gewerk 2 |  Bahnplanung  |  SoSe 2018  </a:t>
-            </a:r>
-            <a:r>
-              <a:rPr lang="de-DE">
+              <a:rPr lang="de-DE" dirty="0"/>
+              <a:t>VPJ Gewerk 2 |  Bahnplanung  | </a:t>
+            </a:r>
+            <a:r>
+              <a:rPr lang="de-DE" dirty="0" err="1"/>
+              <a:t>SoSe</a:t>
+            </a:r>
+            <a:r>
+              <a:rPr lang="de-DE" dirty="0"/>
+              <a:t> 2018  </a:t>
+            </a:r>
+            <a:r>
+              <a:rPr lang="de-DE" dirty="0">
                 <a:cs typeface="Arial" charset="0"/>
               </a:rPr>
-              <a:t>|  Robin Möller, Inke Heynen, Jan Gellermann</a:t>
+              <a:t>|  Robin Möller, Inke Heynen, Jan </a:t>
+            </a:r>
+            <a:r>
+              <a:rPr lang="de-DE" dirty="0" err="1">
+                <a:cs typeface="Arial" charset="0"/>
+              </a:rPr>
+              <a:t>Gellermann</a:t>
             </a:r>
             <a:endParaRPr lang="de-DE" dirty="0">
               <a:cs typeface="Arial" charset="0"/>
@@ -3542,7 +3524,7 @@
           <p:cNvPr id="5" name="Foliennummernplatzhalter 4">
             <a:extLst>
               <a:ext uri="{FF2B5EF4-FFF2-40B4-BE49-F238E27FC236}">
-                <a16:creationId xmlns:a16="http://schemas.microsoft.com/office/drawing/2014/main" id="{43A387BD-F344-4FCB-AF63-CA7D8E6B2EB1}"/>
+                <a16:creationId xmlns:a16="http://schemas.microsoft.com/office/drawing/2014/main" id="{4C25DBB2-B24D-49AD-BB7F-6A16BA69840D}"/>
               </a:ext>
             </a:extLst>
           </p:cNvPr>
@@ -3577,7 +3559,7 @@
     </p:spTree>
     <p:extLst>
       <p:ext uri="{BB962C8B-B14F-4D97-AF65-F5344CB8AC3E}">
-        <p14:creationId xmlns:p14="http://schemas.microsoft.com/office/powerpoint/2010/main" val="3378529180"/>
+        <p14:creationId xmlns:p14="http://schemas.microsoft.com/office/powerpoint/2010/main" val="3861007313"/>
       </p:ext>
     </p:extLst>
   </p:cSld>
@@ -3610,6 +3592,206 @@
           <p:cNvPr id="2" name="Titel 1">
             <a:extLst>
               <a:ext uri="{FF2B5EF4-FFF2-40B4-BE49-F238E27FC236}">
+                <a16:creationId xmlns:a16="http://schemas.microsoft.com/office/drawing/2014/main" id="{F3639E51-5011-4217-810D-F122D87922E7}"/>
+              </a:ext>
+            </a:extLst>
+          </p:cNvPr>
+          <p:cNvSpPr>
+            <a:spLocks noGrp="1"/>
+          </p:cNvSpPr>
+          <p:nvPr>
+            <p:ph type="title"/>
+          </p:nvPr>
+        </p:nvSpPr>
+        <p:spPr/>
+        <p:txBody>
+          <a:bodyPr/>
+          <a:lstStyle/>
+          <a:p>
+            <a:r>
+              <a:rPr lang="de-DE" dirty="0" err="1"/>
+              <a:t>Robotino</a:t>
+            </a:r>
+            <a:r>
+              <a:rPr lang="de-DE" dirty="0"/>
+              <a:t> 2.0</a:t>
+            </a:r>
+          </a:p>
+        </p:txBody>
+      </p:sp>
+      <p:sp>
+        <p:nvSpPr>
+          <p:cNvPr id="3" name="Inhaltsplatzhalter 2">
+            <a:extLst>
+              <a:ext uri="{FF2B5EF4-FFF2-40B4-BE49-F238E27FC236}">
+                <a16:creationId xmlns:a16="http://schemas.microsoft.com/office/drawing/2014/main" id="{A1594824-0012-4797-AAE7-048655F517C9}"/>
+              </a:ext>
+            </a:extLst>
+          </p:cNvPr>
+          <p:cNvSpPr>
+            <a:spLocks noGrp="1"/>
+          </p:cNvSpPr>
+          <p:nvPr>
+            <p:ph idx="1"/>
+          </p:nvPr>
+        </p:nvSpPr>
+        <p:spPr/>
+        <p:txBody>
+          <a:bodyPr/>
+          <a:lstStyle/>
+          <a:p>
+            <a:pPr marL="285750" indent="-285750">
+              <a:buFont typeface="Arial" panose="020B0604020202020204" pitchFamily="34" charset="0"/>
+              <a:buChar char="•"/>
+            </a:pPr>
+            <a:r>
+              <a:rPr lang="de-DE" sz="1800" dirty="0"/>
+              <a:t>Im Prinzip gleiches Programm wie </a:t>
+            </a:r>
+            <a:r>
+              <a:rPr lang="de-DE" sz="1800" dirty="0" err="1"/>
+              <a:t>Robotino</a:t>
+            </a:r>
+            <a:r>
+              <a:rPr lang="de-DE" sz="1800" dirty="0"/>
+              <a:t> 1.0</a:t>
+            </a:r>
+          </a:p>
+          <a:p>
+            <a:pPr marL="285750" indent="-285750">
+              <a:buFont typeface="Arial" panose="020B0604020202020204" pitchFamily="34" charset="0"/>
+              <a:buChar char="•"/>
+            </a:pPr>
+            <a:r>
+              <a:rPr lang="de-DE" sz="1800" dirty="0"/>
+              <a:t>Wenig Anpassungen</a:t>
+            </a:r>
+          </a:p>
+          <a:p>
+            <a:pPr marL="285750" indent="-285750">
+              <a:buFont typeface="Arial" panose="020B0604020202020204" pitchFamily="34" charset="0"/>
+              <a:buChar char="•"/>
+            </a:pPr>
+            <a:r>
+              <a:rPr lang="de-DE" sz="1800" dirty="0"/>
+              <a:t>Eigene Ladestation und Übergabepunkte</a:t>
+            </a:r>
+          </a:p>
+        </p:txBody>
+      </p:sp>
+      <p:sp>
+        <p:nvSpPr>
+          <p:cNvPr id="4" name="Fußzeilenplatzhalter 3">
+            <a:extLst>
+              <a:ext uri="{FF2B5EF4-FFF2-40B4-BE49-F238E27FC236}">
+                <a16:creationId xmlns:a16="http://schemas.microsoft.com/office/drawing/2014/main" id="{10069B3C-7643-4D6C-9022-3F34C2215C51}"/>
+              </a:ext>
+            </a:extLst>
+          </p:cNvPr>
+          <p:cNvSpPr>
+            <a:spLocks noGrp="1"/>
+          </p:cNvSpPr>
+          <p:nvPr>
+            <p:ph type="ftr" sz="quarter" idx="10"/>
+          </p:nvPr>
+        </p:nvSpPr>
+        <p:spPr/>
+        <p:txBody>
+          <a:bodyPr/>
+          <a:lstStyle/>
+          <a:p>
+            <a:pPr>
+              <a:defRPr/>
+            </a:pPr>
+            <a:r>
+              <a:rPr lang="de-DE"/>
+              <a:t>VPJ Gewerk 2 |  Bahnplanung  |  SoSe 2018  </a:t>
+            </a:r>
+            <a:r>
+              <a:rPr lang="de-DE">
+                <a:cs typeface="Arial" charset="0"/>
+              </a:rPr>
+              <a:t>|  Robin Möller, Inke Heynen, Jan Gellermann</a:t>
+            </a:r>
+            <a:endParaRPr lang="de-DE" dirty="0">
+              <a:cs typeface="Arial" charset="0"/>
+            </a:endParaRPr>
+          </a:p>
+        </p:txBody>
+      </p:sp>
+      <p:sp>
+        <p:nvSpPr>
+          <p:cNvPr id="5" name="Foliennummernplatzhalter 4">
+            <a:extLst>
+              <a:ext uri="{FF2B5EF4-FFF2-40B4-BE49-F238E27FC236}">
+                <a16:creationId xmlns:a16="http://schemas.microsoft.com/office/drawing/2014/main" id="{43A387BD-F344-4FCB-AF63-CA7D8E6B2EB1}"/>
+              </a:ext>
+            </a:extLst>
+          </p:cNvPr>
+          <p:cNvSpPr>
+            <a:spLocks noGrp="1"/>
+          </p:cNvSpPr>
+          <p:nvPr>
+            <p:ph type="sldNum" sz="quarter" idx="11"/>
+          </p:nvPr>
+        </p:nvSpPr>
+        <p:spPr/>
+        <p:txBody>
+          <a:bodyPr/>
+          <a:lstStyle/>
+          <a:p>
+            <a:fld id="{7FFA0C58-318F-4968-B44E-A586A02707A0}" type="slidenum">
+              <a:rPr lang="de-DE" altLang="es-ES" smtClean="0"/>
+              <a:pPr/>
+              <a:t>12</a:t>
+            </a:fld>
+            <a:r>
+              <a:rPr lang="de-DE" altLang="es-ES">
+                <a:solidFill>
+                  <a:schemeClr val="accent2"/>
+                </a:solidFill>
+              </a:rPr>
+              <a:t> </a:t>
+            </a:r>
+          </a:p>
+        </p:txBody>
+      </p:sp>
+    </p:spTree>
+    <p:extLst>
+      <p:ext uri="{BB962C8B-B14F-4D97-AF65-F5344CB8AC3E}">
+        <p14:creationId xmlns:p14="http://schemas.microsoft.com/office/powerpoint/2010/main" val="3378529180"/>
+      </p:ext>
+    </p:extLst>
+  </p:cSld>
+  <p:clrMapOvr>
+    <a:masterClrMapping/>
+  </p:clrMapOvr>
+  <p:transition/>
+</p:sld>
+</file>
+
+<file path=ppt/slides/slide13.xml><?xml version="1.0" encoding="utf-8"?>
+<p:sld xmlns:a="http://schemas.openxmlformats.org/drawingml/2006/main" xmlns:r="http://schemas.openxmlformats.org/officeDocument/2006/relationships" xmlns:p="http://schemas.openxmlformats.org/presentationml/2006/main">
+  <p:cSld>
+    <p:spTree>
+      <p:nvGrpSpPr>
+        <p:cNvPr id="1" name=""/>
+        <p:cNvGrpSpPr/>
+        <p:nvPr/>
+      </p:nvGrpSpPr>
+      <p:grpSpPr>
+        <a:xfrm>
+          <a:off x="0" y="0"/>
+          <a:ext cx="0" cy="0"/>
+          <a:chOff x="0" y="0"/>
+          <a:chExt cx="0" cy="0"/>
+        </a:xfrm>
+      </p:grpSpPr>
+      <p:sp>
+        <p:nvSpPr>
+          <p:cNvPr id="2" name="Titel 1">
+            <a:extLst>
+              <a:ext uri="{FF2B5EF4-FFF2-40B4-BE49-F238E27FC236}">
                 <a16:creationId xmlns:a16="http://schemas.microsoft.com/office/drawing/2014/main" id="{0DE113FB-13E9-4EBE-83D1-36549BEDE9B3}"/>
               </a:ext>
             </a:extLst>
@@ -3704,7 +3886,7 @@
             <a:fld id="{7FFA0C58-318F-4968-B44E-A586A02707A0}" type="slidenum">
               <a:rPr lang="de-DE" altLang="es-ES" smtClean="0"/>
               <a:pPr/>
-              <a:t>12</a:t>
+              <a:t>13</a:t>
             </a:fld>
             <a:r>
               <a:rPr lang="de-DE" altLang="es-ES">

</xml_diff>

<commit_message>
Fehlerfall getaucht in Präsi
</commit_message>
<xml_diff>
--- a/Präsentationen/Endpräsi.pptx
+++ b/Präsentationen/Endpräsi.pptx
@@ -13,9 +13,9 @@
   <p:sldIdLst>
     <p:sldId id="334" r:id="rId2"/>
     <p:sldId id="427" r:id="rId3"/>
-    <p:sldId id="439" r:id="rId4"/>
-    <p:sldId id="447" r:id="rId5"/>
-    <p:sldId id="438" r:id="rId6"/>
+    <p:sldId id="438" r:id="rId4"/>
+    <p:sldId id="439" r:id="rId5"/>
+    <p:sldId id="447" r:id="rId6"/>
     <p:sldId id="442" r:id="rId7"/>
     <p:sldId id="436" r:id="rId8"/>
     <p:sldId id="445" r:id="rId9"/>
@@ -2771,6 +2771,16 @@
               </a:rPr>
               <a:t> Gewerk 2</a:t>
             </a:r>
+            <a:r>
+              <a:rPr lang="en-US" dirty="0">
+                <a:solidFill>
+                  <a:schemeClr val="tx1"/>
+                </a:solidFill>
+                <a:latin typeface="+mj-ea"/>
+                <a:cs typeface="+mj-ea"/>
+              </a:rPr>
+              <a:t/>
+            </a:r>
             <a:br>
               <a:rPr lang="en-US" dirty="0">
                 <a:solidFill>
@@ -2815,6 +2825,14 @@
                 <a:spcPct val="90000"/>
               </a:lnSpc>
             </a:pPr>
+            <a:r>
+              <a:rPr lang="en-US" dirty="0">
+                <a:solidFill>
+                  <a:schemeClr val="tx1"/>
+                </a:solidFill>
+              </a:rPr>
+              <a:t/>
+            </a:r>
             <a:br>
               <a:rPr lang="en-US" dirty="0">
                 <a:solidFill>
@@ -2957,7 +2975,7 @@
           <p:cNvPr id="4" name="Grafik 3">
             <a:extLst>
               <a:ext uri="{FF2B5EF4-FFF2-40B4-BE49-F238E27FC236}">
-                <a16:creationId xmlns:a16="http://schemas.microsoft.com/office/drawing/2014/main" id="{E8FD4E4A-4BD4-441B-A6FB-F1DF917A54FF}"/>
+                <a16:creationId xmlns:a16="http://schemas.microsoft.com/office/drawing/2014/main" xmlns="" id="{E8FD4E4A-4BD4-441B-A6FB-F1DF917A54FF}"/>
               </a:ext>
             </a:extLst>
           </p:cNvPr>
@@ -2993,7 +3011,7 @@
           <p:cNvPr id="6" name="Grafik 5">
             <a:extLst>
               <a:ext uri="{FF2B5EF4-FFF2-40B4-BE49-F238E27FC236}">
-                <a16:creationId xmlns:a16="http://schemas.microsoft.com/office/drawing/2014/main" id="{2FAA14AD-2BD0-4AB6-B784-D2821EEA1036}"/>
+                <a16:creationId xmlns:a16="http://schemas.microsoft.com/office/drawing/2014/main" xmlns="" id="{2FAA14AD-2BD0-4AB6-B784-D2821EEA1036}"/>
               </a:ext>
             </a:extLst>
           </p:cNvPr>
@@ -3055,7 +3073,7 @@
           <p:cNvPr id="2" name="Titel 1">
             <a:extLst>
               <a:ext uri="{FF2B5EF4-FFF2-40B4-BE49-F238E27FC236}">
-                <a16:creationId xmlns:a16="http://schemas.microsoft.com/office/drawing/2014/main" id="{77C7410A-A749-403D-90C6-63AE79254069}"/>
+                <a16:creationId xmlns:a16="http://schemas.microsoft.com/office/drawing/2014/main" xmlns="" id="{77C7410A-A749-403D-90C6-63AE79254069}"/>
               </a:ext>
             </a:extLst>
           </p:cNvPr>
@@ -3083,7 +3101,7 @@
           <p:cNvPr id="3" name="Inhaltsplatzhalter 2">
             <a:extLst>
               <a:ext uri="{FF2B5EF4-FFF2-40B4-BE49-F238E27FC236}">
-                <a16:creationId xmlns:a16="http://schemas.microsoft.com/office/drawing/2014/main" id="{6ABAA3C3-7524-4E18-9B49-AA59EE12C569}"/>
+                <a16:creationId xmlns:a16="http://schemas.microsoft.com/office/drawing/2014/main" xmlns="" id="{6ABAA3C3-7524-4E18-9B49-AA59EE12C569}"/>
               </a:ext>
             </a:extLst>
           </p:cNvPr>
@@ -3115,7 +3133,11 @@
             </a:pPr>
             <a:r>
               <a:rPr lang="de-DE" sz="1800" dirty="0"/>
-              <a:t>Kein Werkstück vorhanden, wo eins abgeholt werden soll</a:t>
+              <a:t>Kein Werkstück vorhanden, wo eins abgeholt werden </a:t>
+            </a:r>
+            <a:r>
+              <a:rPr lang="de-DE" sz="1800" dirty="0" smtClean="0"/>
+              <a:t>soll</a:t>
             </a:r>
           </a:p>
           <a:p>
@@ -3124,9 +3146,10 @@
               <a:buChar char="•"/>
             </a:pPr>
             <a:r>
-              <a:rPr lang="de-DE" sz="1800" dirty="0"/>
-              <a:t>Bereits ein Werkstück da, wo eins abgelegt werden soll</a:t>
-            </a:r>
+              <a:rPr lang="de-DE" sz="1800" dirty="0" smtClean="0"/>
+              <a:t>Beim Transport wird ein Werkstück verloren</a:t>
+            </a:r>
+            <a:endParaRPr lang="de-DE" sz="1800" dirty="0"/>
           </a:p>
           <a:p>
             <a:pPr lvl="2">
@@ -3135,11 +3158,7 @@
             </a:pPr>
             <a:r>
               <a:rPr lang="de-DE" sz="1800" dirty="0"/>
-              <a:t>Station und alle </a:t>
-            </a:r>
-            <a:r>
-              <a:rPr lang="de-DE" sz="1800"/>
-              <a:t>Fifo-Plätze besetzt</a:t>
+              <a:t>Bereits ein Werkstück da, wo eins abgelegt werden soll</a:t>
             </a:r>
           </a:p>
           <a:p>
@@ -3147,7 +3166,7 @@
               <a:buFont typeface="Arial" panose="020B0604020202020204" pitchFamily="34" charset="0"/>
               <a:buChar char="•"/>
             </a:pPr>
-            <a:endParaRPr lang="de-DE" sz="1800"/>
+            <a:endParaRPr lang="de-DE" sz="1800" dirty="0"/>
           </a:p>
         </p:txBody>
       </p:sp>
@@ -3156,7 +3175,7 @@
           <p:cNvPr id="4" name="Fußzeilenplatzhalter 3">
             <a:extLst>
               <a:ext uri="{FF2B5EF4-FFF2-40B4-BE49-F238E27FC236}">
-                <a16:creationId xmlns:a16="http://schemas.microsoft.com/office/drawing/2014/main" id="{78B07854-0228-4BD8-B365-CD96563C4722}"/>
+                <a16:creationId xmlns:a16="http://schemas.microsoft.com/office/drawing/2014/main" xmlns="" id="{78B07854-0228-4BD8-B365-CD96563C4722}"/>
               </a:ext>
             </a:extLst>
           </p:cNvPr>
@@ -3196,7 +3215,7 @@
           <p:cNvPr id="5" name="Foliennummernplatzhalter 4">
             <a:extLst>
               <a:ext uri="{FF2B5EF4-FFF2-40B4-BE49-F238E27FC236}">
-                <a16:creationId xmlns:a16="http://schemas.microsoft.com/office/drawing/2014/main" id="{BCD3049B-3E92-4BC4-B654-90432C8C6D39}"/>
+                <a16:creationId xmlns:a16="http://schemas.microsoft.com/office/drawing/2014/main" xmlns="" id="{BCD3049B-3E92-4BC4-B654-90432C8C6D39}"/>
               </a:ext>
             </a:extLst>
           </p:cNvPr>
@@ -3264,7 +3283,7 @@
           <p:cNvPr id="2" name="Titel 1">
             <a:extLst>
               <a:ext uri="{FF2B5EF4-FFF2-40B4-BE49-F238E27FC236}">
-                <a16:creationId xmlns:a16="http://schemas.microsoft.com/office/drawing/2014/main" id="{69D175C7-2277-48EE-80FF-0E761953819F}"/>
+                <a16:creationId xmlns:a16="http://schemas.microsoft.com/office/drawing/2014/main" xmlns="" id="{69D175C7-2277-48EE-80FF-0E761953819F}"/>
               </a:ext>
             </a:extLst>
           </p:cNvPr>
@@ -3292,7 +3311,7 @@
           <p:cNvPr id="3" name="Inhaltsplatzhalter 2">
             <a:extLst>
               <a:ext uri="{FF2B5EF4-FFF2-40B4-BE49-F238E27FC236}">
-                <a16:creationId xmlns:a16="http://schemas.microsoft.com/office/drawing/2014/main" id="{D48E999B-3E55-4E29-B367-1F5A664CD438}"/>
+                <a16:creationId xmlns:a16="http://schemas.microsoft.com/office/drawing/2014/main" xmlns="" id="{D48E999B-3E55-4E29-B367-1F5A664CD438}"/>
               </a:ext>
             </a:extLst>
           </p:cNvPr>
@@ -3470,7 +3489,7 @@
           <p:cNvPr id="4" name="Fußzeilenplatzhalter 3">
             <a:extLst>
               <a:ext uri="{FF2B5EF4-FFF2-40B4-BE49-F238E27FC236}">
-                <a16:creationId xmlns:a16="http://schemas.microsoft.com/office/drawing/2014/main" id="{2137E165-7B19-4681-A71E-0B75A5F168F0}"/>
+                <a16:creationId xmlns:a16="http://schemas.microsoft.com/office/drawing/2014/main" xmlns="" id="{2137E165-7B19-4681-A71E-0B75A5F168F0}"/>
               </a:ext>
             </a:extLst>
           </p:cNvPr>
@@ -3524,7 +3543,7 @@
           <p:cNvPr id="5" name="Foliennummernplatzhalter 4">
             <a:extLst>
               <a:ext uri="{FF2B5EF4-FFF2-40B4-BE49-F238E27FC236}">
-                <a16:creationId xmlns:a16="http://schemas.microsoft.com/office/drawing/2014/main" id="{4C25DBB2-B24D-49AD-BB7F-6A16BA69840D}"/>
+                <a16:creationId xmlns:a16="http://schemas.microsoft.com/office/drawing/2014/main" xmlns="" id="{4C25DBB2-B24D-49AD-BB7F-6A16BA69840D}"/>
               </a:ext>
             </a:extLst>
           </p:cNvPr>
@@ -3592,7 +3611,7 @@
           <p:cNvPr id="2" name="Titel 1">
             <a:extLst>
               <a:ext uri="{FF2B5EF4-FFF2-40B4-BE49-F238E27FC236}">
-                <a16:creationId xmlns:a16="http://schemas.microsoft.com/office/drawing/2014/main" id="{F3639E51-5011-4217-810D-F122D87922E7}"/>
+                <a16:creationId xmlns:a16="http://schemas.microsoft.com/office/drawing/2014/main" xmlns="" id="{F3639E51-5011-4217-810D-F122D87922E7}"/>
               </a:ext>
             </a:extLst>
           </p:cNvPr>
@@ -3624,7 +3643,7 @@
           <p:cNvPr id="3" name="Inhaltsplatzhalter 2">
             <a:extLst>
               <a:ext uri="{FF2B5EF4-FFF2-40B4-BE49-F238E27FC236}">
-                <a16:creationId xmlns:a16="http://schemas.microsoft.com/office/drawing/2014/main" id="{A1594824-0012-4797-AAE7-048655F517C9}"/>
+                <a16:creationId xmlns:a16="http://schemas.microsoft.com/office/drawing/2014/main" xmlns="" id="{A1594824-0012-4797-AAE7-048655F517C9}"/>
               </a:ext>
             </a:extLst>
           </p:cNvPr>
@@ -3684,7 +3703,7 @@
           <p:cNvPr id="4" name="Fußzeilenplatzhalter 3">
             <a:extLst>
               <a:ext uri="{FF2B5EF4-FFF2-40B4-BE49-F238E27FC236}">
-                <a16:creationId xmlns:a16="http://schemas.microsoft.com/office/drawing/2014/main" id="{10069B3C-7643-4D6C-9022-3F34C2215C51}"/>
+                <a16:creationId xmlns:a16="http://schemas.microsoft.com/office/drawing/2014/main" xmlns="" id="{10069B3C-7643-4D6C-9022-3F34C2215C51}"/>
               </a:ext>
             </a:extLst>
           </p:cNvPr>
@@ -3724,7 +3743,7 @@
           <p:cNvPr id="5" name="Foliennummernplatzhalter 4">
             <a:extLst>
               <a:ext uri="{FF2B5EF4-FFF2-40B4-BE49-F238E27FC236}">
-                <a16:creationId xmlns:a16="http://schemas.microsoft.com/office/drawing/2014/main" id="{43A387BD-F344-4FCB-AF63-CA7D8E6B2EB1}"/>
+                <a16:creationId xmlns:a16="http://schemas.microsoft.com/office/drawing/2014/main" xmlns="" id="{43A387BD-F344-4FCB-AF63-CA7D8E6B2EB1}"/>
               </a:ext>
             </a:extLst>
           </p:cNvPr>
@@ -3792,7 +3811,7 @@
           <p:cNvPr id="2" name="Titel 1">
             <a:extLst>
               <a:ext uri="{FF2B5EF4-FFF2-40B4-BE49-F238E27FC236}">
-                <a16:creationId xmlns:a16="http://schemas.microsoft.com/office/drawing/2014/main" id="{0DE113FB-13E9-4EBE-83D1-36549BEDE9B3}"/>
+                <a16:creationId xmlns:a16="http://schemas.microsoft.com/office/drawing/2014/main" xmlns="" id="{0DE113FB-13E9-4EBE-83D1-36549BEDE9B3}"/>
               </a:ext>
             </a:extLst>
           </p:cNvPr>
@@ -3827,7 +3846,7 @@
           <p:cNvPr id="4" name="Fußzeilenplatzhalter 3">
             <a:extLst>
               <a:ext uri="{FF2B5EF4-FFF2-40B4-BE49-F238E27FC236}">
-                <a16:creationId xmlns:a16="http://schemas.microsoft.com/office/drawing/2014/main" id="{4F8AE508-9E5F-4810-ADFD-2B16A9A9B7BF}"/>
+                <a16:creationId xmlns:a16="http://schemas.microsoft.com/office/drawing/2014/main" xmlns="" id="{4F8AE508-9E5F-4810-ADFD-2B16A9A9B7BF}"/>
               </a:ext>
             </a:extLst>
           </p:cNvPr>
@@ -3867,7 +3886,7 @@
           <p:cNvPr id="5" name="Foliennummernplatzhalter 4">
             <a:extLst>
               <a:ext uri="{FF2B5EF4-FFF2-40B4-BE49-F238E27FC236}">
-                <a16:creationId xmlns:a16="http://schemas.microsoft.com/office/drawing/2014/main" id="{E58A3AE0-41E8-4290-A24B-CBD45BFF565F}"/>
+                <a16:creationId xmlns:a16="http://schemas.microsoft.com/office/drawing/2014/main" xmlns="" id="{E58A3AE0-41E8-4290-A24B-CBD45BFF565F}"/>
               </a:ext>
             </a:extLst>
           </p:cNvPr>
@@ -3904,7 +3923,7 @@
           <p:cNvPr id="14" name="Inhaltsplatzhalter 13">
             <a:extLst>
               <a:ext uri="{FF2B5EF4-FFF2-40B4-BE49-F238E27FC236}">
-                <a16:creationId xmlns:a16="http://schemas.microsoft.com/office/drawing/2014/main" id="{AD79B16F-E1D2-4831-8438-42DCC430CC3C}"/>
+                <a16:creationId xmlns:a16="http://schemas.microsoft.com/office/drawing/2014/main" xmlns="" id="{AD79B16F-E1D2-4831-8438-42DCC430CC3C}"/>
               </a:ext>
             </a:extLst>
           </p:cNvPr>
@@ -3977,7 +3996,7 @@
           <p:cNvPr id="16" name="Grafik 15">
             <a:extLst>
               <a:ext uri="{FF2B5EF4-FFF2-40B4-BE49-F238E27FC236}">
-                <a16:creationId xmlns:a16="http://schemas.microsoft.com/office/drawing/2014/main" id="{2E0C0D6F-2419-433D-8A3A-87D155F1B6A1}"/>
+                <a16:creationId xmlns:a16="http://schemas.microsoft.com/office/drawing/2014/main" xmlns="" id="{2E0C0D6F-2419-433D-8A3A-87D155F1B6A1}"/>
               </a:ext>
             </a:extLst>
           </p:cNvPr>
@@ -3987,7 +4006,7 @@
           <p:nvPr/>
         </p:nvPicPr>
         <p:blipFill>
-          <a:blip r:embed="rId2">
+          <a:blip r:embed="rId2" cstate="print">
             <a:extLst>
               <a:ext uri="{28A0092B-C50C-407E-A947-70E740481C1C}">
                 <a14:useLocalDpi xmlns:a14="http://schemas.microsoft.com/office/drawing/2010/main" val="0"/>
@@ -4013,7 +4032,7 @@
           <p:cNvPr id="18" name="Grafik 17">
             <a:extLst>
               <a:ext uri="{FF2B5EF4-FFF2-40B4-BE49-F238E27FC236}">
-                <a16:creationId xmlns:a16="http://schemas.microsoft.com/office/drawing/2014/main" id="{079156A6-DD69-4D3B-B7F6-C495DAB36451}"/>
+                <a16:creationId xmlns:a16="http://schemas.microsoft.com/office/drawing/2014/main" xmlns="" id="{079156A6-DD69-4D3B-B7F6-C495DAB36451}"/>
               </a:ext>
             </a:extLst>
           </p:cNvPr>
@@ -4155,7 +4174,7 @@
           <p:cNvPr id="2" name="Titel 1">
             <a:extLst>
               <a:ext uri="{FF2B5EF4-FFF2-40B4-BE49-F238E27FC236}">
-                <a16:creationId xmlns:a16="http://schemas.microsoft.com/office/drawing/2014/main" id="{199E0412-C9C1-4338-AF11-254B58531795}"/>
+                <a16:creationId xmlns:a16="http://schemas.microsoft.com/office/drawing/2014/main" xmlns="" id="{199E0412-C9C1-4338-AF11-254B58531795}"/>
               </a:ext>
             </a:extLst>
           </p:cNvPr>
@@ -4184,7 +4203,7 @@
           <p:cNvPr id="3" name="Inhaltsplatzhalter 2">
             <a:extLst>
               <a:ext uri="{FF2B5EF4-FFF2-40B4-BE49-F238E27FC236}">
-                <a16:creationId xmlns:a16="http://schemas.microsoft.com/office/drawing/2014/main" id="{C398954B-85C0-425D-A3DF-8844D64D05F0}"/>
+                <a16:creationId xmlns:a16="http://schemas.microsoft.com/office/drawing/2014/main" xmlns="" id="{C398954B-85C0-425D-A3DF-8844D64D05F0}"/>
               </a:ext>
             </a:extLst>
           </p:cNvPr>
@@ -4267,7 +4286,7 @@
           <p:cNvPr id="4" name="Fußzeilenplatzhalter 3">
             <a:extLst>
               <a:ext uri="{FF2B5EF4-FFF2-40B4-BE49-F238E27FC236}">
-                <a16:creationId xmlns:a16="http://schemas.microsoft.com/office/drawing/2014/main" id="{CF38E57F-8951-4C6C-808C-D512836D4D27}"/>
+                <a16:creationId xmlns:a16="http://schemas.microsoft.com/office/drawing/2014/main" xmlns="" id="{CF38E57F-8951-4C6C-808C-D512836D4D27}"/>
               </a:ext>
             </a:extLst>
           </p:cNvPr>
@@ -4321,7 +4340,7 @@
           <p:cNvPr id="5" name="Foliennummernplatzhalter 4">
             <a:extLst>
               <a:ext uri="{FF2B5EF4-FFF2-40B4-BE49-F238E27FC236}">
-                <a16:creationId xmlns:a16="http://schemas.microsoft.com/office/drawing/2014/main" id="{DF2B7CFB-9EDB-41B2-98FF-80F53662EB29}"/>
+                <a16:creationId xmlns:a16="http://schemas.microsoft.com/office/drawing/2014/main" xmlns="" id="{DF2B7CFB-9EDB-41B2-98FF-80F53662EB29}"/>
               </a:ext>
             </a:extLst>
           </p:cNvPr>
@@ -4389,7 +4408,7 @@
           <p:cNvPr id="2" name="Titel 1">
             <a:extLst>
               <a:ext uri="{FF2B5EF4-FFF2-40B4-BE49-F238E27FC236}">
-                <a16:creationId xmlns:a16="http://schemas.microsoft.com/office/drawing/2014/main" id="{1D01E2E5-1074-46DC-8480-1F80146A86FC}"/>
+                <a16:creationId xmlns:a16="http://schemas.microsoft.com/office/drawing/2014/main" xmlns="" id="{46690A77-D47F-472A-AB27-1C3F26DAFD45}"/>
               </a:ext>
             </a:extLst>
           </p:cNvPr>
@@ -4417,7 +4436,7 @@
           <p:cNvPr id="4" name="Fußzeilenplatzhalter 3">
             <a:extLst>
               <a:ext uri="{FF2B5EF4-FFF2-40B4-BE49-F238E27FC236}">
-                <a16:creationId xmlns:a16="http://schemas.microsoft.com/office/drawing/2014/main" id="{583DA148-6337-4743-A905-1AE732F50969}"/>
+                <a16:creationId xmlns:a16="http://schemas.microsoft.com/office/drawing/2014/main" xmlns="" id="{0437E12D-4F3D-495B-A07A-B6FA7C40A8D3}"/>
               </a:ext>
             </a:extLst>
           </p:cNvPr>
@@ -4437,14 +4456,28 @@
               <a:defRPr/>
             </a:pPr>
             <a:r>
-              <a:rPr lang="de-DE"/>
-              <a:t>VPJ Gewerk 2 |  Bahnplanung  |  SoSe 2018  </a:t>
-            </a:r>
-            <a:r>
-              <a:rPr lang="de-DE">
+              <a:rPr lang="de-DE" dirty="0"/>
+              <a:t>VPJ Gewerk 2 |  Bahnplanung  |  </a:t>
+            </a:r>
+            <a:r>
+              <a:rPr lang="de-DE" dirty="0" err="1"/>
+              <a:t>SoSe</a:t>
+            </a:r>
+            <a:r>
+              <a:rPr lang="de-DE" dirty="0"/>
+              <a:t> 2018  </a:t>
+            </a:r>
+            <a:r>
+              <a:rPr lang="de-DE" dirty="0">
                 <a:cs typeface="Arial" charset="0"/>
               </a:rPr>
-              <a:t>|  Robin Möller, Inke Heynen, Jan Gellermann</a:t>
+              <a:t>|  Robin Möller, Inke Heynen, Jan </a:t>
+            </a:r>
+            <a:r>
+              <a:rPr lang="de-DE" dirty="0" err="1">
+                <a:cs typeface="Arial" charset="0"/>
+              </a:rPr>
+              <a:t>Gellermann</a:t>
             </a:r>
             <a:endParaRPr lang="de-DE" dirty="0">
               <a:cs typeface="Arial" charset="0"/>
@@ -4457,7 +4490,7 @@
           <p:cNvPr id="5" name="Foliennummernplatzhalter 4">
             <a:extLst>
               <a:ext uri="{FF2B5EF4-FFF2-40B4-BE49-F238E27FC236}">
-                <a16:creationId xmlns:a16="http://schemas.microsoft.com/office/drawing/2014/main" id="{A0D5C8BD-9677-4BC5-A234-D3DA6C5C17F2}"/>
+                <a16:creationId xmlns:a16="http://schemas.microsoft.com/office/drawing/2014/main" xmlns="" id="{0886D6B4-2E03-4E02-8110-641A267784A8}"/>
               </a:ext>
             </a:extLst>
           </p:cNvPr>
@@ -4491,10 +4524,10 @@
       </p:sp>
       <p:pic>
         <p:nvPicPr>
-          <p:cNvPr id="8" name="Inhaltsplatzhalter 7">
+          <p:cNvPr id="9" name="Inhaltsplatzhalter 8">
             <a:extLst>
               <a:ext uri="{FF2B5EF4-FFF2-40B4-BE49-F238E27FC236}">
-                <a16:creationId xmlns:a16="http://schemas.microsoft.com/office/drawing/2014/main" id="{2D7B404C-6E29-4EAB-ABEB-6FF3532E892F}"/>
+                <a16:creationId xmlns:a16="http://schemas.microsoft.com/office/drawing/2014/main" xmlns="" id="{4E0A2C57-F1B1-41D8-83F3-C708FFB3744D}"/>
               </a:ext>
             </a:extLst>
           </p:cNvPr>
@@ -4519,15 +4552,15 @@
         </p:blipFill>
         <p:spPr>
           <a:xfrm>
-            <a:off x="320675" y="1421203"/>
-            <a:ext cx="9344025" cy="4668056"/>
+            <a:off x="320675" y="1341221"/>
+            <a:ext cx="9344025" cy="4828020"/>
           </a:xfrm>
         </p:spPr>
       </p:pic>
     </p:spTree>
     <p:extLst>
       <p:ext uri="{BB962C8B-B14F-4D97-AF65-F5344CB8AC3E}">
-        <p14:creationId xmlns:p14="http://schemas.microsoft.com/office/powerpoint/2010/main" val="3102421075"/>
+        <p14:creationId xmlns:p14="http://schemas.microsoft.com/office/powerpoint/2010/main" val="400690389"/>
       </p:ext>
     </p:extLst>
   </p:cSld>
@@ -4560,7 +4593,7 @@
           <p:cNvPr id="2" name="Titel 1">
             <a:extLst>
               <a:ext uri="{FF2B5EF4-FFF2-40B4-BE49-F238E27FC236}">
-                <a16:creationId xmlns:a16="http://schemas.microsoft.com/office/drawing/2014/main" id="{1D01E2E5-1074-46DC-8480-1F80146A86FC}"/>
+                <a16:creationId xmlns:a16="http://schemas.microsoft.com/office/drawing/2014/main" xmlns="" id="{1D01E2E5-1074-46DC-8480-1F80146A86FC}"/>
               </a:ext>
             </a:extLst>
           </p:cNvPr>
@@ -4588,7 +4621,7 @@
           <p:cNvPr id="4" name="Fußzeilenplatzhalter 3">
             <a:extLst>
               <a:ext uri="{FF2B5EF4-FFF2-40B4-BE49-F238E27FC236}">
-                <a16:creationId xmlns:a16="http://schemas.microsoft.com/office/drawing/2014/main" id="{583DA148-6337-4743-A905-1AE732F50969}"/>
+                <a16:creationId xmlns:a16="http://schemas.microsoft.com/office/drawing/2014/main" xmlns="" id="{583DA148-6337-4743-A905-1AE732F50969}"/>
               </a:ext>
             </a:extLst>
           </p:cNvPr>
@@ -4628,7 +4661,7 @@
           <p:cNvPr id="5" name="Foliennummernplatzhalter 4">
             <a:extLst>
               <a:ext uri="{FF2B5EF4-FFF2-40B4-BE49-F238E27FC236}">
-                <a16:creationId xmlns:a16="http://schemas.microsoft.com/office/drawing/2014/main" id="{A0D5C8BD-9677-4BC5-A234-D3DA6C5C17F2}"/>
+                <a16:creationId xmlns:a16="http://schemas.microsoft.com/office/drawing/2014/main" xmlns="" id="{A0D5C8BD-9677-4BC5-A234-D3DA6C5C17F2}"/>
               </a:ext>
             </a:extLst>
           </p:cNvPr>
@@ -4662,10 +4695,10 @@
       </p:sp>
       <p:pic>
         <p:nvPicPr>
-          <p:cNvPr id="9" name="Inhaltsplatzhalter 8">
+          <p:cNvPr id="8" name="Inhaltsplatzhalter 7">
             <a:extLst>
               <a:ext uri="{FF2B5EF4-FFF2-40B4-BE49-F238E27FC236}">
-                <a16:creationId xmlns:a16="http://schemas.microsoft.com/office/drawing/2014/main" id="{59BC9062-F814-426E-96AA-3E0DF14A7F5A}"/>
+                <a16:creationId xmlns:a16="http://schemas.microsoft.com/office/drawing/2014/main" xmlns="" id="{2D7B404C-6E29-4EAB-ABEB-6FF3532E892F}"/>
               </a:ext>
             </a:extLst>
           </p:cNvPr>
@@ -4690,15 +4723,15 @@
         </p:blipFill>
         <p:spPr>
           <a:xfrm>
-            <a:off x="320675" y="1431103"/>
-            <a:ext cx="9344025" cy="4648256"/>
+            <a:off x="320675" y="1421203"/>
+            <a:ext cx="9344025" cy="4668056"/>
           </a:xfrm>
         </p:spPr>
       </p:pic>
     </p:spTree>
     <p:extLst>
       <p:ext uri="{BB962C8B-B14F-4D97-AF65-F5344CB8AC3E}">
-        <p14:creationId xmlns:p14="http://schemas.microsoft.com/office/powerpoint/2010/main" val="1268259379"/>
+        <p14:creationId xmlns:p14="http://schemas.microsoft.com/office/powerpoint/2010/main" val="3102421075"/>
       </p:ext>
     </p:extLst>
   </p:cSld>
@@ -4731,7 +4764,7 @@
           <p:cNvPr id="2" name="Titel 1">
             <a:extLst>
               <a:ext uri="{FF2B5EF4-FFF2-40B4-BE49-F238E27FC236}">
-                <a16:creationId xmlns:a16="http://schemas.microsoft.com/office/drawing/2014/main" id="{46690A77-D47F-472A-AB27-1C3F26DAFD45}"/>
+                <a16:creationId xmlns:a16="http://schemas.microsoft.com/office/drawing/2014/main" xmlns="" id="{1D01E2E5-1074-46DC-8480-1F80146A86FC}"/>
               </a:ext>
             </a:extLst>
           </p:cNvPr>
@@ -4759,7 +4792,7 @@
           <p:cNvPr id="4" name="Fußzeilenplatzhalter 3">
             <a:extLst>
               <a:ext uri="{FF2B5EF4-FFF2-40B4-BE49-F238E27FC236}">
-                <a16:creationId xmlns:a16="http://schemas.microsoft.com/office/drawing/2014/main" id="{0437E12D-4F3D-495B-A07A-B6FA7C40A8D3}"/>
+                <a16:creationId xmlns:a16="http://schemas.microsoft.com/office/drawing/2014/main" xmlns="" id="{583DA148-6337-4743-A905-1AE732F50969}"/>
               </a:ext>
             </a:extLst>
           </p:cNvPr>
@@ -4779,28 +4812,14 @@
               <a:defRPr/>
             </a:pPr>
             <a:r>
-              <a:rPr lang="de-DE" dirty="0"/>
-              <a:t>VPJ Gewerk 2 |  Bahnplanung  |  </a:t>
-            </a:r>
-            <a:r>
-              <a:rPr lang="de-DE" dirty="0" err="1"/>
-              <a:t>SoSe</a:t>
-            </a:r>
-            <a:r>
-              <a:rPr lang="de-DE" dirty="0"/>
-              <a:t> 2018  </a:t>
-            </a:r>
-            <a:r>
-              <a:rPr lang="de-DE" dirty="0">
+              <a:rPr lang="de-DE"/>
+              <a:t>VPJ Gewerk 2 |  Bahnplanung  |  SoSe 2018  </a:t>
+            </a:r>
+            <a:r>
+              <a:rPr lang="de-DE">
                 <a:cs typeface="Arial" charset="0"/>
               </a:rPr>
-              <a:t>|  Robin Möller, Inke Heynen, Jan </a:t>
-            </a:r>
-            <a:r>
-              <a:rPr lang="de-DE" dirty="0" err="1">
-                <a:cs typeface="Arial" charset="0"/>
-              </a:rPr>
-              <a:t>Gellermann</a:t>
+              <a:t>|  Robin Möller, Inke Heynen, Jan Gellermann</a:t>
             </a:r>
             <a:endParaRPr lang="de-DE" dirty="0">
               <a:cs typeface="Arial" charset="0"/>
@@ -4813,7 +4832,7 @@
           <p:cNvPr id="5" name="Foliennummernplatzhalter 4">
             <a:extLst>
               <a:ext uri="{FF2B5EF4-FFF2-40B4-BE49-F238E27FC236}">
-                <a16:creationId xmlns:a16="http://schemas.microsoft.com/office/drawing/2014/main" id="{0886D6B4-2E03-4E02-8110-641A267784A8}"/>
+                <a16:creationId xmlns:a16="http://schemas.microsoft.com/office/drawing/2014/main" xmlns="" id="{A0D5C8BD-9677-4BC5-A234-D3DA6C5C17F2}"/>
               </a:ext>
             </a:extLst>
           </p:cNvPr>
@@ -4850,7 +4869,7 @@
           <p:cNvPr id="9" name="Inhaltsplatzhalter 8">
             <a:extLst>
               <a:ext uri="{FF2B5EF4-FFF2-40B4-BE49-F238E27FC236}">
-                <a16:creationId xmlns:a16="http://schemas.microsoft.com/office/drawing/2014/main" id="{4E0A2C57-F1B1-41D8-83F3-C708FFB3744D}"/>
+                <a16:creationId xmlns:a16="http://schemas.microsoft.com/office/drawing/2014/main" xmlns="" id="{59BC9062-F814-426E-96AA-3E0DF14A7F5A}"/>
               </a:ext>
             </a:extLst>
           </p:cNvPr>
@@ -4875,15 +4894,15 @@
         </p:blipFill>
         <p:spPr>
           <a:xfrm>
-            <a:off x="320675" y="1341221"/>
-            <a:ext cx="9344025" cy="4828020"/>
+            <a:off x="320675" y="1431103"/>
+            <a:ext cx="9344025" cy="4648256"/>
           </a:xfrm>
         </p:spPr>
       </p:pic>
     </p:spTree>
     <p:extLst>
       <p:ext uri="{BB962C8B-B14F-4D97-AF65-F5344CB8AC3E}">
-        <p14:creationId xmlns:p14="http://schemas.microsoft.com/office/powerpoint/2010/main" val="400690389"/>
+        <p14:creationId xmlns:p14="http://schemas.microsoft.com/office/powerpoint/2010/main" val="1268259379"/>
       </p:ext>
     </p:extLst>
   </p:cSld>
@@ -4916,7 +4935,7 @@
           <p:cNvPr id="2" name="Titel 1">
             <a:extLst>
               <a:ext uri="{FF2B5EF4-FFF2-40B4-BE49-F238E27FC236}">
-                <a16:creationId xmlns:a16="http://schemas.microsoft.com/office/drawing/2014/main" id="{2D3E2030-5BB9-4D06-91FD-164687F4F48F}"/>
+                <a16:creationId xmlns:a16="http://schemas.microsoft.com/office/drawing/2014/main" xmlns="" id="{2D3E2030-5BB9-4D06-91FD-164687F4F48F}"/>
               </a:ext>
             </a:extLst>
           </p:cNvPr>
@@ -4944,7 +4963,7 @@
           <p:cNvPr id="4" name="Fußzeilenplatzhalter 3">
             <a:extLst>
               <a:ext uri="{FF2B5EF4-FFF2-40B4-BE49-F238E27FC236}">
-                <a16:creationId xmlns:a16="http://schemas.microsoft.com/office/drawing/2014/main" id="{8D087DE4-FA3C-4B3F-8025-4A054DA6B3BD}"/>
+                <a16:creationId xmlns:a16="http://schemas.microsoft.com/office/drawing/2014/main" xmlns="" id="{8D087DE4-FA3C-4B3F-8025-4A054DA6B3BD}"/>
               </a:ext>
             </a:extLst>
           </p:cNvPr>
@@ -4984,7 +5003,7 @@
           <p:cNvPr id="5" name="Foliennummernplatzhalter 4">
             <a:extLst>
               <a:ext uri="{FF2B5EF4-FFF2-40B4-BE49-F238E27FC236}">
-                <a16:creationId xmlns:a16="http://schemas.microsoft.com/office/drawing/2014/main" id="{E0035365-0548-47C9-BEA8-79F847D29ED9}"/>
+                <a16:creationId xmlns:a16="http://schemas.microsoft.com/office/drawing/2014/main" xmlns="" id="{E0035365-0548-47C9-BEA8-79F847D29ED9}"/>
               </a:ext>
             </a:extLst>
           </p:cNvPr>
@@ -5021,7 +5040,7 @@
           <p:cNvPr id="11" name="Inhaltsplatzhalter 10">
             <a:extLst>
               <a:ext uri="{FF2B5EF4-FFF2-40B4-BE49-F238E27FC236}">
-                <a16:creationId xmlns:a16="http://schemas.microsoft.com/office/drawing/2014/main" id="{E1E1C9C5-F4AD-4A8E-BFF9-9CDDE1129207}"/>
+                <a16:creationId xmlns:a16="http://schemas.microsoft.com/office/drawing/2014/main" xmlns="" id="{E1E1C9C5-F4AD-4A8E-BFF9-9CDDE1129207}"/>
               </a:ext>
             </a:extLst>
           </p:cNvPr>
@@ -5087,7 +5106,7 @@
           <p:cNvPr id="2" name="Titel 1">
             <a:extLst>
               <a:ext uri="{FF2B5EF4-FFF2-40B4-BE49-F238E27FC236}">
-                <a16:creationId xmlns:a16="http://schemas.microsoft.com/office/drawing/2014/main" id="{4A0F5E8D-F58A-4E19-847B-829BC0D241AE}"/>
+                <a16:creationId xmlns:a16="http://schemas.microsoft.com/office/drawing/2014/main" xmlns="" id="{4A0F5E8D-F58A-4E19-847B-829BC0D241AE}"/>
               </a:ext>
             </a:extLst>
           </p:cNvPr>
@@ -5115,7 +5134,7 @@
           <p:cNvPr id="3" name="Inhaltsplatzhalter 2">
             <a:extLst>
               <a:ext uri="{FF2B5EF4-FFF2-40B4-BE49-F238E27FC236}">
-                <a16:creationId xmlns:a16="http://schemas.microsoft.com/office/drawing/2014/main" id="{5A6611EA-D485-4EFE-BAE3-245FB9833B89}"/>
+                <a16:creationId xmlns:a16="http://schemas.microsoft.com/office/drawing/2014/main" xmlns="" id="{5A6611EA-D485-4EFE-BAE3-245FB9833B89}"/>
               </a:ext>
             </a:extLst>
           </p:cNvPr>
@@ -5240,7 +5259,7 @@
           <p:cNvPr id="4" name="Fußzeilenplatzhalter 3">
             <a:extLst>
               <a:ext uri="{FF2B5EF4-FFF2-40B4-BE49-F238E27FC236}">
-                <a16:creationId xmlns:a16="http://schemas.microsoft.com/office/drawing/2014/main" id="{22BA5185-90F9-48FD-BC24-F8F43126611C}"/>
+                <a16:creationId xmlns:a16="http://schemas.microsoft.com/office/drawing/2014/main" xmlns="" id="{22BA5185-90F9-48FD-BC24-F8F43126611C}"/>
               </a:ext>
             </a:extLst>
           </p:cNvPr>
@@ -5294,7 +5313,7 @@
           <p:cNvPr id="5" name="Foliennummernplatzhalter 4">
             <a:extLst>
               <a:ext uri="{FF2B5EF4-FFF2-40B4-BE49-F238E27FC236}">
-                <a16:creationId xmlns:a16="http://schemas.microsoft.com/office/drawing/2014/main" id="{8A66F8E3-E660-4C88-A4B4-347CF57581B2}"/>
+                <a16:creationId xmlns:a16="http://schemas.microsoft.com/office/drawing/2014/main" xmlns="" id="{8A66F8E3-E660-4C88-A4B4-347CF57581B2}"/>
               </a:ext>
             </a:extLst>
           </p:cNvPr>
@@ -5331,7 +5350,7 @@
           <p:cNvPr id="7" name="Grafik 6">
             <a:extLst>
               <a:ext uri="{FF2B5EF4-FFF2-40B4-BE49-F238E27FC236}">
-                <a16:creationId xmlns:a16="http://schemas.microsoft.com/office/drawing/2014/main" id="{C29A8163-ADF9-4618-A744-D39307692309}"/>
+                <a16:creationId xmlns:a16="http://schemas.microsoft.com/office/drawing/2014/main" xmlns="" id="{C29A8163-ADF9-4618-A744-D39307692309}"/>
               </a:ext>
             </a:extLst>
           </p:cNvPr>
@@ -5367,7 +5386,7 @@
           <p:cNvPr id="8" name="Pfeil: nach rechts 7">
             <a:extLst>
               <a:ext uri="{FF2B5EF4-FFF2-40B4-BE49-F238E27FC236}">
-                <a16:creationId xmlns:a16="http://schemas.microsoft.com/office/drawing/2014/main" id="{CF4A36E8-65DD-415E-BF4C-24F89800958C}"/>
+                <a16:creationId xmlns:a16="http://schemas.microsoft.com/office/drawing/2014/main" xmlns="" id="{CF4A36E8-65DD-415E-BF4C-24F89800958C}"/>
               </a:ext>
             </a:extLst>
           </p:cNvPr>
@@ -5444,7 +5463,7 @@
           <p:cNvPr id="2" name="Titel 1">
             <a:extLst>
               <a:ext uri="{FF2B5EF4-FFF2-40B4-BE49-F238E27FC236}">
-                <a16:creationId xmlns:a16="http://schemas.microsoft.com/office/drawing/2014/main" id="{4A0F5E8D-F58A-4E19-847B-829BC0D241AE}"/>
+                <a16:creationId xmlns:a16="http://schemas.microsoft.com/office/drawing/2014/main" xmlns="" id="{4A0F5E8D-F58A-4E19-847B-829BC0D241AE}"/>
               </a:ext>
             </a:extLst>
           </p:cNvPr>
@@ -5472,7 +5491,7 @@
           <p:cNvPr id="3" name="Inhaltsplatzhalter 2">
             <a:extLst>
               <a:ext uri="{FF2B5EF4-FFF2-40B4-BE49-F238E27FC236}">
-                <a16:creationId xmlns:a16="http://schemas.microsoft.com/office/drawing/2014/main" id="{5A6611EA-D485-4EFE-BAE3-245FB9833B89}"/>
+                <a16:creationId xmlns:a16="http://schemas.microsoft.com/office/drawing/2014/main" xmlns="" id="{5A6611EA-D485-4EFE-BAE3-245FB9833B89}"/>
               </a:ext>
             </a:extLst>
           </p:cNvPr>
@@ -5578,7 +5597,7 @@
           <p:cNvPr id="4" name="Fußzeilenplatzhalter 3">
             <a:extLst>
               <a:ext uri="{FF2B5EF4-FFF2-40B4-BE49-F238E27FC236}">
-                <a16:creationId xmlns:a16="http://schemas.microsoft.com/office/drawing/2014/main" id="{22BA5185-90F9-48FD-BC24-F8F43126611C}"/>
+                <a16:creationId xmlns:a16="http://schemas.microsoft.com/office/drawing/2014/main" xmlns="" id="{22BA5185-90F9-48FD-BC24-F8F43126611C}"/>
               </a:ext>
             </a:extLst>
           </p:cNvPr>
@@ -5632,7 +5651,7 @@
           <p:cNvPr id="5" name="Foliennummernplatzhalter 4">
             <a:extLst>
               <a:ext uri="{FF2B5EF4-FFF2-40B4-BE49-F238E27FC236}">
-                <a16:creationId xmlns:a16="http://schemas.microsoft.com/office/drawing/2014/main" id="{8A66F8E3-E660-4C88-A4B4-347CF57581B2}"/>
+                <a16:creationId xmlns:a16="http://schemas.microsoft.com/office/drawing/2014/main" xmlns="" id="{8A66F8E3-E660-4C88-A4B4-347CF57581B2}"/>
               </a:ext>
             </a:extLst>
           </p:cNvPr>
@@ -5669,7 +5688,7 @@
           <p:cNvPr id="7" name="Grafik 6">
             <a:extLst>
               <a:ext uri="{FF2B5EF4-FFF2-40B4-BE49-F238E27FC236}">
-                <a16:creationId xmlns:a16="http://schemas.microsoft.com/office/drawing/2014/main" id="{B8EEDB8B-0C1B-4278-BA62-B71C3D16253A}"/>
+                <a16:creationId xmlns:a16="http://schemas.microsoft.com/office/drawing/2014/main" xmlns="" id="{B8EEDB8B-0C1B-4278-BA62-B71C3D16253A}"/>
               </a:ext>
             </a:extLst>
           </p:cNvPr>
@@ -5705,7 +5724,7 @@
           <p:cNvPr id="8" name="Pfeil: nach rechts 7">
             <a:extLst>
               <a:ext uri="{FF2B5EF4-FFF2-40B4-BE49-F238E27FC236}">
-                <a16:creationId xmlns:a16="http://schemas.microsoft.com/office/drawing/2014/main" id="{586405A1-545F-4B02-939C-F560480E8556}"/>
+                <a16:creationId xmlns:a16="http://schemas.microsoft.com/office/drawing/2014/main" xmlns="" id="{586405A1-545F-4B02-939C-F560480E8556}"/>
               </a:ext>
             </a:extLst>
           </p:cNvPr>
@@ -5782,7 +5801,7 @@
           <p:cNvPr id="2" name="Titel 1">
             <a:extLst>
               <a:ext uri="{FF2B5EF4-FFF2-40B4-BE49-F238E27FC236}">
-                <a16:creationId xmlns:a16="http://schemas.microsoft.com/office/drawing/2014/main" id="{4A0F5E8D-F58A-4E19-847B-829BC0D241AE}"/>
+                <a16:creationId xmlns:a16="http://schemas.microsoft.com/office/drawing/2014/main" xmlns="" id="{4A0F5E8D-F58A-4E19-847B-829BC0D241AE}"/>
               </a:ext>
             </a:extLst>
           </p:cNvPr>
@@ -5810,7 +5829,7 @@
           <p:cNvPr id="3" name="Inhaltsplatzhalter 2">
             <a:extLst>
               <a:ext uri="{FF2B5EF4-FFF2-40B4-BE49-F238E27FC236}">
-                <a16:creationId xmlns:a16="http://schemas.microsoft.com/office/drawing/2014/main" id="{5A6611EA-D485-4EFE-BAE3-245FB9833B89}"/>
+                <a16:creationId xmlns:a16="http://schemas.microsoft.com/office/drawing/2014/main" xmlns="" id="{5A6611EA-D485-4EFE-BAE3-245FB9833B89}"/>
               </a:ext>
             </a:extLst>
           </p:cNvPr>
@@ -5923,7 +5942,7 @@
           <p:cNvPr id="4" name="Fußzeilenplatzhalter 3">
             <a:extLst>
               <a:ext uri="{FF2B5EF4-FFF2-40B4-BE49-F238E27FC236}">
-                <a16:creationId xmlns:a16="http://schemas.microsoft.com/office/drawing/2014/main" id="{22BA5185-90F9-48FD-BC24-F8F43126611C}"/>
+                <a16:creationId xmlns:a16="http://schemas.microsoft.com/office/drawing/2014/main" xmlns="" id="{22BA5185-90F9-48FD-BC24-F8F43126611C}"/>
               </a:ext>
             </a:extLst>
           </p:cNvPr>
@@ -5977,7 +5996,7 @@
           <p:cNvPr id="5" name="Foliennummernplatzhalter 4">
             <a:extLst>
               <a:ext uri="{FF2B5EF4-FFF2-40B4-BE49-F238E27FC236}">
-                <a16:creationId xmlns:a16="http://schemas.microsoft.com/office/drawing/2014/main" id="{8A66F8E3-E660-4C88-A4B4-347CF57581B2}"/>
+                <a16:creationId xmlns:a16="http://schemas.microsoft.com/office/drawing/2014/main" xmlns="" id="{8A66F8E3-E660-4C88-A4B4-347CF57581B2}"/>
               </a:ext>
             </a:extLst>
           </p:cNvPr>
@@ -6014,7 +6033,7 @@
           <p:cNvPr id="7" name="Pfeil: nach rechts 6">
             <a:extLst>
               <a:ext uri="{FF2B5EF4-FFF2-40B4-BE49-F238E27FC236}">
-                <a16:creationId xmlns:a16="http://schemas.microsoft.com/office/drawing/2014/main" id="{0D303E9E-B37E-4930-A338-8405AD00A805}"/>
+                <a16:creationId xmlns:a16="http://schemas.microsoft.com/office/drawing/2014/main" xmlns="" id="{0D303E9E-B37E-4930-A338-8405AD00A805}"/>
               </a:ext>
             </a:extLst>
           </p:cNvPr>
@@ -6060,7 +6079,7 @@
           <p:cNvPr id="8" name="Pfeil: nach rechts 7">
             <a:extLst>
               <a:ext uri="{FF2B5EF4-FFF2-40B4-BE49-F238E27FC236}">
-                <a16:creationId xmlns:a16="http://schemas.microsoft.com/office/drawing/2014/main" id="{44FCA105-1888-4AA9-91F4-A151BB70C287}"/>
+                <a16:creationId xmlns:a16="http://schemas.microsoft.com/office/drawing/2014/main" xmlns="" id="{44FCA105-1888-4AA9-91F4-A151BB70C287}"/>
               </a:ext>
             </a:extLst>
           </p:cNvPr>

</xml_diff>